<commit_message>
updated PROIECT FINAL PDF IOLANDA and PROIECT FINAL PPT IOLANDA
</commit_message>
<xml_diff>
--- a/PROIECT FINAL PPT IOLANDA.pptx
+++ b/PROIECT FINAL PPT IOLANDA.pptx
@@ -22,28 +22,29 @@
     <p:sldId id="267" r:id="rId17"/>
     <p:sldId id="268" r:id="rId18"/>
     <p:sldId id="269" r:id="rId19"/>
+    <p:sldId id="270" r:id="rId20"/>
   </p:sldIdLst>
   <p:sldSz cy="5143500" cx="9144000"/>
   <p:notesSz cx="6858000" cy="9144000"/>
   <p:embeddedFontLst>
     <p:embeddedFont>
       <p:font typeface="Roboto Slab"/>
-      <p:regular r:id="rId20"/>
-      <p:bold r:id="rId21"/>
+      <p:regular r:id="rId21"/>
+      <p:bold r:id="rId22"/>
     </p:embeddedFont>
     <p:embeddedFont>
       <p:font typeface="Roboto"/>
-      <p:regular r:id="rId22"/>
-      <p:bold r:id="rId23"/>
-      <p:italic r:id="rId24"/>
-      <p:boldItalic r:id="rId25"/>
+      <p:regular r:id="rId23"/>
+      <p:bold r:id="rId24"/>
+      <p:italic r:id="rId25"/>
+      <p:boldItalic r:id="rId26"/>
     </p:embeddedFont>
     <p:embeddedFont>
       <p:font typeface="EB Garamond SemiBold"/>
-      <p:regular r:id="rId26"/>
-      <p:bold r:id="rId27"/>
-      <p:italic r:id="rId28"/>
-      <p:boldItalic r:id="rId29"/>
+      <p:regular r:id="rId27"/>
+      <p:bold r:id="rId28"/>
+      <p:italic r:id="rId29"/>
+      <p:boldItalic r:id="rId30"/>
     </p:embeddedFont>
   </p:embeddedFontLst>
   <p:defaultTextStyle>
@@ -1220,7 +1221,7 @@
   <p:cSld>
     <p:spTree>
       <p:nvGrpSpPr>
-        <p:cNvPr id="212" name="Shape 212"/>
+        <p:cNvPr id="213" name="Shape 213"/>
         <p:cNvGrpSpPr/>
         <p:nvPr/>
       </p:nvGrpSpPr>
@@ -1234,7 +1235,7 @@
       </p:grpSpPr>
       <p:sp>
         <p:nvSpPr>
-          <p:cNvPr id="213" name="Google Shape;213;g2f6edabc1df_0_14:notes"/>
+          <p:cNvPr id="214" name="Google Shape;214;g2fd3c156ffe_0_5:notes"/>
           <p:cNvSpPr/>
           <p:nvPr>
             <p:ph idx="2" type="sldImg"/>
@@ -1269,7 +1270,106 @@
       </p:sp>
       <p:sp>
         <p:nvSpPr>
-          <p:cNvPr id="214" name="Google Shape;214;g2f6edabc1df_0_14:notes"/>
+          <p:cNvPr id="215" name="Google Shape;215;g2fd3c156ffe_0_5:notes"/>
+          <p:cNvSpPr txBox="1"/>
+          <p:nvPr>
+            <p:ph idx="1" type="body"/>
+          </p:nvPr>
+        </p:nvSpPr>
+        <p:spPr>
+          <a:xfrm>
+            <a:off x="685800" y="4343400"/>
+            <a:ext cx="5486400" cy="4114800"/>
+          </a:xfrm>
+          <a:prstGeom prst="rect">
+            <a:avLst/>
+          </a:prstGeom>
+        </p:spPr>
+        <p:txBody>
+          <a:bodyPr anchorCtr="0" anchor="t" bIns="91425" lIns="91425" spcFirstLastPara="1" rIns="91425" wrap="square" tIns="91425">
+            <a:noAutofit/>
+          </a:bodyPr>
+          <a:lstStyle/>
+          <a:p>
+            <a:pPr indent="0" lvl="0" marL="0" rtl="0" algn="l">
+              <a:spcBef>
+                <a:spcPts val="0"/>
+              </a:spcBef>
+              <a:spcAft>
+                <a:spcPts val="0"/>
+              </a:spcAft>
+              <a:buNone/>
+            </a:pPr>
+            <a:r>
+              <a:t/>
+            </a:r>
+            <a:endParaRPr/>
+          </a:p>
+        </p:txBody>
+      </p:sp>
+    </p:spTree>
+  </p:cSld>
+  <p:clrMapOvr>
+    <a:masterClrMapping/>
+  </p:clrMapOvr>
+</p:notes>
+</file>
+
+<file path=ppt/notesSlides/notesSlide15.xml><?xml version="1.0" encoding="utf-8"?>
+<p:notes xmlns:a="http://schemas.openxmlformats.org/drawingml/2006/main" xmlns:r="http://schemas.openxmlformats.org/officeDocument/2006/relationships" xmlns:mc="http://schemas.openxmlformats.org/markup-compatibility/2006" xmlns:mv="urn:schemas-microsoft-com:mac:vml" xmlns:p="http://schemas.openxmlformats.org/presentationml/2006/main" xmlns:c="http://schemas.openxmlformats.org/drawingml/2006/chart" xmlns:dgm="http://schemas.openxmlformats.org/drawingml/2006/diagram" xmlns:o="urn:schemas-microsoft-com:office:office" xmlns:v="urn:schemas-microsoft-com:vml" xmlns:pvml="urn:schemas-microsoft-com:office:powerpoint" xmlns:com="http://schemas.openxmlformats.org/drawingml/2006/compatibility" xmlns:p14="http://schemas.microsoft.com/office/powerpoint/2010/main" xmlns:p15="http://schemas.microsoft.com/office/powerpoint/2012/main" xmlns:ahyp="http://schemas.microsoft.com/office/drawing/2018/hyperlinkcolor" showMasterPhAnim="0" showMasterSp="0">
+  <p:cSld>
+    <p:spTree>
+      <p:nvGrpSpPr>
+        <p:cNvPr id="219" name="Shape 219"/>
+        <p:cNvGrpSpPr/>
+        <p:nvPr/>
+      </p:nvGrpSpPr>
+      <p:grpSpPr>
+        <a:xfrm>
+          <a:off x="0" y="0"/>
+          <a:ext cx="0" cy="0"/>
+          <a:chOff x="0" y="0"/>
+          <a:chExt cx="0" cy="0"/>
+        </a:xfrm>
+      </p:grpSpPr>
+      <p:sp>
+        <p:nvSpPr>
+          <p:cNvPr id="220" name="Google Shape;220;g2f6edabc1df_0_14:notes"/>
+          <p:cNvSpPr/>
+          <p:nvPr>
+            <p:ph idx="2" type="sldImg"/>
+          </p:nvPr>
+        </p:nvSpPr>
+        <p:spPr>
+          <a:xfrm>
+            <a:off x="381300" y="685800"/>
+            <a:ext cx="6096000" cy="3429000"/>
+          </a:xfrm>
+          <a:custGeom>
+            <a:rect b="b" l="l" r="r" t="t"/>
+            <a:pathLst>
+              <a:path extrusionOk="0" h="120000" w="120000">
+                <a:moveTo>
+                  <a:pt x="0" y="0"/>
+                </a:moveTo>
+                <a:lnTo>
+                  <a:pt x="120000" y="0"/>
+                </a:lnTo>
+                <a:lnTo>
+                  <a:pt x="120000" y="120000"/>
+                </a:lnTo>
+                <a:lnTo>
+                  <a:pt x="0" y="120000"/>
+                </a:lnTo>
+                <a:close/>
+              </a:path>
+            </a:pathLst>
+          </a:custGeom>
+        </p:spPr>
+      </p:sp>
+      <p:sp>
+        <p:nvSpPr>
+          <p:cNvPr id="221" name="Google Shape;221;g2f6edabc1df_0_14:notes"/>
           <p:cNvSpPr txBox="1"/>
           <p:nvPr>
             <p:ph idx="1" type="body"/>
@@ -11172,6 +11272,55 @@
           </a:p>
         </p:txBody>
       </p:sp>
+      <p:sp>
+        <p:nvSpPr>
+          <p:cNvPr id="212" name="Google Shape;212;p25"/>
+          <p:cNvSpPr txBox="1"/>
+          <p:nvPr/>
+        </p:nvSpPr>
+        <p:spPr>
+          <a:xfrm>
+            <a:off x="4797050" y="3930925"/>
+            <a:ext cx="4370700" cy="461700"/>
+          </a:xfrm>
+          <a:prstGeom prst="rect">
+            <a:avLst/>
+          </a:prstGeom>
+          <a:noFill/>
+          <a:ln>
+            <a:noFill/>
+          </a:ln>
+        </p:spPr>
+        <p:txBody>
+          <a:bodyPr anchorCtr="0" anchor="t" bIns="91425" lIns="91425" spcFirstLastPara="1" rIns="91425" wrap="square" tIns="91425">
+            <a:spAutoFit/>
+          </a:bodyPr>
+          <a:lstStyle/>
+          <a:p>
+            <a:pPr indent="0" lvl="0" marL="0" rtl="0" algn="l">
+              <a:spcBef>
+                <a:spcPts val="0"/>
+              </a:spcBef>
+              <a:spcAft>
+                <a:spcPts val="0"/>
+              </a:spcAft>
+              <a:buNone/>
+            </a:pPr>
+            <a:r>
+              <a:t/>
+            </a:r>
+            <a:endParaRPr sz="1800">
+              <a:solidFill>
+                <a:schemeClr val="dk1"/>
+              </a:solidFill>
+              <a:latin typeface="Roboto"/>
+              <a:ea typeface="Roboto"/>
+              <a:cs typeface="Roboto"/>
+              <a:sym typeface="Roboto"/>
+            </a:endParaRPr>
+          </a:p>
+        </p:txBody>
+      </p:sp>
     </p:spTree>
   </p:cSld>
   <p:clrMapOvr>
@@ -11185,7 +11334,7 @@
   <p:cSld>
     <p:spTree>
       <p:nvGrpSpPr>
-        <p:cNvPr id="215" name="Shape 215"/>
+        <p:cNvPr id="216" name="Shape 216"/>
         <p:cNvGrpSpPr/>
         <p:nvPr/>
       </p:nvGrpSpPr>
@@ -11199,7 +11348,130 @@
       </p:grpSpPr>
       <p:sp>
         <p:nvSpPr>
-          <p:cNvPr id="216" name="Google Shape;216;p26"/>
+          <p:cNvPr id="217" name="Google Shape;217;p26"/>
+          <p:cNvSpPr txBox="1"/>
+          <p:nvPr/>
+        </p:nvSpPr>
+        <p:spPr>
+          <a:xfrm>
+            <a:off x="3011450" y="253175"/>
+            <a:ext cx="4357200" cy="461700"/>
+          </a:xfrm>
+          <a:prstGeom prst="rect">
+            <a:avLst/>
+          </a:prstGeom>
+          <a:noFill/>
+          <a:ln>
+            <a:noFill/>
+          </a:ln>
+        </p:spPr>
+        <p:txBody>
+          <a:bodyPr anchorCtr="0" anchor="t" bIns="91425" lIns="91425" spcFirstLastPara="1" rIns="91425" wrap="square" tIns="91425">
+            <a:spAutoFit/>
+          </a:bodyPr>
+          <a:lstStyle/>
+          <a:p>
+            <a:pPr indent="0" lvl="0" marL="0" rtl="0" algn="l">
+              <a:spcBef>
+                <a:spcPts val="0"/>
+              </a:spcBef>
+              <a:spcAft>
+                <a:spcPts val="0"/>
+              </a:spcAft>
+              <a:buNone/>
+            </a:pPr>
+            <a:r>
+              <a:rPr lang="ro" sz="1800">
+                <a:solidFill>
+                  <a:schemeClr val="dk1"/>
+                </a:solidFill>
+                <a:latin typeface="Roboto"/>
+                <a:ea typeface="Roboto"/>
+                <a:cs typeface="Roboto"/>
+                <a:sym typeface="Roboto"/>
+              </a:rPr>
+              <a:t>Schema </a:t>
+            </a:r>
+            <a:r>
+              <a:rPr lang="ro" sz="1800">
+                <a:solidFill>
+                  <a:srgbClr val="FFFF00"/>
+                </a:solidFill>
+                <a:latin typeface="Roboto"/>
+                <a:ea typeface="Roboto"/>
+                <a:cs typeface="Roboto"/>
+                <a:sym typeface="Roboto"/>
+              </a:rPr>
+              <a:t>reverse engineer</a:t>
+            </a:r>
+            <a:endParaRPr sz="1800">
+              <a:solidFill>
+                <a:srgbClr val="FFFF00"/>
+              </a:solidFill>
+              <a:latin typeface="Roboto"/>
+              <a:ea typeface="Roboto"/>
+              <a:cs typeface="Roboto"/>
+              <a:sym typeface="Roboto"/>
+            </a:endParaRPr>
+          </a:p>
+        </p:txBody>
+      </p:sp>
+      <p:pic>
+        <p:nvPicPr>
+          <p:cNvPr id="218" name="Google Shape;218;p26"/>
+          <p:cNvPicPr preferRelativeResize="0"/>
+          <p:nvPr/>
+        </p:nvPicPr>
+        <p:blipFill>
+          <a:blip r:embed="rId3">
+            <a:alphaModFix/>
+          </a:blip>
+          <a:stretch>
+            <a:fillRect/>
+          </a:stretch>
+        </p:blipFill>
+        <p:spPr>
+          <a:xfrm>
+            <a:off x="1630063" y="913800"/>
+            <a:ext cx="5883875" cy="3658426"/>
+          </a:xfrm>
+          <a:prstGeom prst="rect">
+            <a:avLst/>
+          </a:prstGeom>
+          <a:noFill/>
+          <a:ln>
+            <a:noFill/>
+          </a:ln>
+        </p:spPr>
+      </p:pic>
+    </p:spTree>
+  </p:cSld>
+  <p:clrMapOvr>
+    <a:masterClrMapping/>
+  </p:clrMapOvr>
+</p:sld>
+</file>
+
+<file path=ppt/slides/slide15.xml><?xml version="1.0" encoding="utf-8"?>
+<p:sld xmlns:a="http://schemas.openxmlformats.org/drawingml/2006/main" xmlns:r="http://schemas.openxmlformats.org/officeDocument/2006/relationships" xmlns:mc="http://schemas.openxmlformats.org/markup-compatibility/2006" xmlns:mv="urn:schemas-microsoft-com:mac:vml" xmlns:p="http://schemas.openxmlformats.org/presentationml/2006/main" xmlns:c="http://schemas.openxmlformats.org/drawingml/2006/chart" xmlns:dgm="http://schemas.openxmlformats.org/drawingml/2006/diagram" xmlns:o="urn:schemas-microsoft-com:office:office" xmlns:v="urn:schemas-microsoft-com:vml" xmlns:pvml="urn:schemas-microsoft-com:office:powerpoint" xmlns:com="http://schemas.openxmlformats.org/drawingml/2006/compatibility" xmlns:p14="http://schemas.microsoft.com/office/powerpoint/2010/main" xmlns:p15="http://schemas.microsoft.com/office/powerpoint/2012/main" xmlns:ahyp="http://schemas.microsoft.com/office/drawing/2018/hyperlinkcolor">
+  <p:cSld>
+    <p:spTree>
+      <p:nvGrpSpPr>
+        <p:cNvPr id="222" name="Shape 222"/>
+        <p:cNvGrpSpPr/>
+        <p:nvPr/>
+      </p:nvGrpSpPr>
+      <p:grpSpPr>
+        <a:xfrm>
+          <a:off x="0" y="0"/>
+          <a:ext cx="0" cy="0"/>
+          <a:chOff x="0" y="0"/>
+          <a:chExt cx="0" cy="0"/>
+        </a:xfrm>
+      </p:grpSpPr>
+      <p:sp>
+        <p:nvSpPr>
+          <p:cNvPr id="223" name="Google Shape;223;p27"/>
           <p:cNvSpPr txBox="1"/>
           <p:nvPr>
             <p:ph type="title"/>
@@ -11291,7 +11563,7 @@
       </p:sp>
       <p:sp>
         <p:nvSpPr>
-          <p:cNvPr id="217" name="Google Shape;217;p26"/>
+          <p:cNvPr id="224" name="Google Shape;224;p27"/>
           <p:cNvSpPr txBox="1"/>
           <p:nvPr/>
         </p:nvSpPr>
@@ -13113,7 +13385,7 @@
                   <a:schemeClr val="dk1"/>
                 </a:solidFill>
               </a:rPr>
-              <a:t> verifica daca produsul isi indeplineste testele, iar </a:t>
+              <a:t> verifica daca produsul isi indeplineste functiile, iar </a:t>
             </a:r>
             <a:r>
               <a:rPr lang="ro" sz="1200">
@@ -15727,7 +15999,7 @@
         </p:nvSpPr>
         <p:spPr>
           <a:xfrm>
-            <a:off x="187025" y="373975"/>
+            <a:off x="99950" y="201675"/>
             <a:ext cx="2272800" cy="369300"/>
           </a:xfrm>
           <a:prstGeom prst="rect">
@@ -15797,7 +16069,7 @@
         </p:nvSpPr>
         <p:spPr>
           <a:xfrm>
-            <a:off x="4446400" y="373975"/>
+            <a:off x="4572000" y="147450"/>
             <a:ext cx="1989900" cy="369300"/>
           </a:xfrm>
           <a:prstGeom prst="rect">
@@ -15867,56 +16139,7 @@
         </p:nvSpPr>
         <p:spPr>
           <a:xfrm>
-            <a:off x="3112200" y="2603275"/>
-            <a:ext cx="6054900" cy="461700"/>
-          </a:xfrm>
-          <a:prstGeom prst="rect">
-            <a:avLst/>
-          </a:prstGeom>
-          <a:noFill/>
-          <a:ln>
-            <a:noFill/>
-          </a:ln>
-        </p:spPr>
-        <p:txBody>
-          <a:bodyPr anchorCtr="0" anchor="t" bIns="91425" lIns="91425" spcFirstLastPara="1" rIns="91425" wrap="square" tIns="91425">
-            <a:spAutoFit/>
-          </a:bodyPr>
-          <a:lstStyle/>
-          <a:p>
-            <a:pPr indent="0" lvl="0" marL="0" rtl="0" algn="l">
-              <a:spcBef>
-                <a:spcPts val="0"/>
-              </a:spcBef>
-              <a:spcAft>
-                <a:spcPts val="0"/>
-              </a:spcAft>
-              <a:buNone/>
-            </a:pPr>
-            <a:r>
-              <a:t/>
-            </a:r>
-            <a:endParaRPr sz="1800">
-              <a:solidFill>
-                <a:schemeClr val="dk1"/>
-              </a:solidFill>
-              <a:latin typeface="Roboto"/>
-              <a:ea typeface="Roboto"/>
-              <a:cs typeface="Roboto"/>
-              <a:sym typeface="Roboto"/>
-            </a:endParaRPr>
-          </a:p>
-        </p:txBody>
-      </p:sp>
-      <p:sp>
-        <p:nvSpPr>
-          <p:cNvPr id="116" name="Google Shape;116;p20"/>
-          <p:cNvSpPr txBox="1"/>
-          <p:nvPr/>
-        </p:nvSpPr>
-        <p:spPr>
-          <a:xfrm>
-            <a:off x="241400" y="1526725"/>
+            <a:off x="99950" y="1153600"/>
             <a:ext cx="1989900" cy="554100"/>
           </a:xfrm>
           <a:prstGeom prst="rect">
@@ -16012,7 +16235,7 @@
       </p:sp>
       <p:pic>
         <p:nvPicPr>
-          <p:cNvPr id="117" name="Google Shape;117;p20"/>
+          <p:cNvPr id="116" name="Google Shape;116;p20"/>
           <p:cNvPicPr preferRelativeResize="0"/>
           <p:nvPr/>
         </p:nvPicPr>
@@ -16026,7 +16249,7 @@
         </p:blipFill>
         <p:spPr>
           <a:xfrm>
-            <a:off x="2066275" y="201675"/>
+            <a:off x="1973000" y="40600"/>
             <a:ext cx="2198575" cy="828262"/>
           </a:xfrm>
           <a:prstGeom prst="rect">
@@ -16040,14 +16263,14 @@
       </p:pic>
       <p:sp>
         <p:nvSpPr>
-          <p:cNvPr id="118" name="Google Shape;118;p20"/>
+          <p:cNvPr id="117" name="Google Shape;117;p20"/>
           <p:cNvSpPr txBox="1"/>
           <p:nvPr/>
         </p:nvSpPr>
         <p:spPr>
           <a:xfrm>
-            <a:off x="187025" y="3270425"/>
-            <a:ext cx="5110800" cy="923400"/>
+            <a:off x="40850" y="2861263"/>
+            <a:ext cx="5345700" cy="738900"/>
           </a:xfrm>
           <a:prstGeom prst="rect">
             <a:avLst/>
@@ -16073,50 +16296,6 @@
               <a:buNone/>
             </a:pPr>
             <a:r>
-              <a:rPr b="1" lang="ro" sz="1200">
-                <a:solidFill>
-                  <a:schemeClr val="dk1"/>
-                </a:solidFill>
-                <a:latin typeface="Roboto"/>
-                <a:ea typeface="Roboto"/>
-                <a:cs typeface="Roboto"/>
-                <a:sym typeface="Roboto"/>
-              </a:rPr>
-              <a:t>                                           </a:t>
-            </a:r>
-            <a:r>
-              <a:rPr b="1" lang="ro" sz="1200">
-                <a:solidFill>
-                  <a:srgbClr val="FF9900"/>
-                </a:solidFill>
-                <a:latin typeface="Roboto"/>
-                <a:ea typeface="Roboto"/>
-                <a:cs typeface="Roboto"/>
-                <a:sym typeface="Roboto"/>
-              </a:rPr>
-              <a:t>    Foreign key </a:t>
-            </a:r>
-            <a:endParaRPr b="1" sz="1200">
-              <a:solidFill>
-                <a:srgbClr val="FF9900"/>
-              </a:solidFill>
-              <a:latin typeface="Roboto"/>
-              <a:ea typeface="Roboto"/>
-              <a:cs typeface="Roboto"/>
-              <a:sym typeface="Roboto"/>
-            </a:endParaRPr>
-          </a:p>
-          <a:p>
-            <a:pPr indent="0" lvl="0" marL="0" rtl="0" algn="l">
-              <a:spcBef>
-                <a:spcPts val="0"/>
-              </a:spcBef>
-              <a:spcAft>
-                <a:spcPts val="0"/>
-              </a:spcAft>
-              <a:buNone/>
-            </a:pPr>
-            <a:r>
               <a:rPr lang="ro" sz="1200">
                 <a:solidFill>
                   <a:schemeClr val="dk1"/>
@@ -16258,7 +16437,7 @@
       </p:sp>
       <p:pic>
         <p:nvPicPr>
-          <p:cNvPr id="119" name="Google Shape;119;p20"/>
+          <p:cNvPr id="118" name="Google Shape;118;p20"/>
           <p:cNvPicPr preferRelativeResize="0"/>
           <p:nvPr/>
         </p:nvPicPr>
@@ -16272,7 +16451,7 @@
         </p:blipFill>
         <p:spPr>
           <a:xfrm>
-            <a:off x="2066275" y="1355500"/>
+            <a:off x="1973000" y="1035963"/>
             <a:ext cx="2198575" cy="922191"/>
           </a:xfrm>
           <a:prstGeom prst="rect">
@@ -16286,7 +16465,7 @@
       </p:pic>
       <p:sp>
         <p:nvSpPr>
-          <p:cNvPr id="120" name="Google Shape;120;p20"/>
+          <p:cNvPr id="119" name="Google Shape;119;p20"/>
           <p:cNvSpPr txBox="1"/>
           <p:nvPr/>
         </p:nvSpPr>
@@ -16335,7 +16514,7 @@
       </p:sp>
       <p:pic>
         <p:nvPicPr>
-          <p:cNvPr id="121" name="Google Shape;121;p20"/>
+          <p:cNvPr id="120" name="Google Shape;120;p20"/>
           <p:cNvPicPr preferRelativeResize="0"/>
           <p:nvPr/>
         </p:nvPicPr>
@@ -16349,7 +16528,7 @@
         </p:blipFill>
         <p:spPr>
           <a:xfrm>
-            <a:off x="6617850" y="212900"/>
+            <a:off x="6406875" y="40600"/>
             <a:ext cx="2403300" cy="691455"/>
           </a:xfrm>
           <a:prstGeom prst="rect">
@@ -16363,13 +16542,13 @@
       </p:pic>
       <p:sp>
         <p:nvSpPr>
-          <p:cNvPr id="122" name="Google Shape;122;p20"/>
+          <p:cNvPr id="121" name="Google Shape;121;p20"/>
           <p:cNvSpPr txBox="1"/>
           <p:nvPr/>
         </p:nvSpPr>
         <p:spPr>
           <a:xfrm>
-            <a:off x="4491275" y="1526725"/>
+            <a:off x="4396638" y="1084950"/>
             <a:ext cx="1989900" cy="554100"/>
           </a:xfrm>
           <a:prstGeom prst="rect">
@@ -16465,7 +16644,7 @@
       </p:sp>
       <p:pic>
         <p:nvPicPr>
-          <p:cNvPr id="123" name="Google Shape;123;p20"/>
+          <p:cNvPr id="122" name="Google Shape;122;p20"/>
           <p:cNvPicPr preferRelativeResize="0"/>
           <p:nvPr/>
         </p:nvPicPr>
@@ -16479,7 +16658,7 @@
         </p:blipFill>
         <p:spPr>
           <a:xfrm>
-            <a:off x="6611612" y="1365262"/>
+            <a:off x="6611637" y="989412"/>
             <a:ext cx="2198575" cy="928286"/>
           </a:xfrm>
           <a:prstGeom prst="rect">
@@ -16493,14 +16672,14 @@
       </p:pic>
       <p:sp>
         <p:nvSpPr>
-          <p:cNvPr id="124" name="Google Shape;124;p20"/>
+          <p:cNvPr id="123" name="Google Shape;123;p20"/>
           <p:cNvSpPr txBox="1"/>
           <p:nvPr/>
         </p:nvSpPr>
         <p:spPr>
           <a:xfrm>
-            <a:off x="187025" y="2423150"/>
-            <a:ext cx="5173200" cy="923400"/>
+            <a:off x="40850" y="1987663"/>
+            <a:ext cx="5227500" cy="923400"/>
           </a:xfrm>
           <a:prstGeom prst="rect">
             <a:avLst/>
@@ -16559,7 +16738,7 @@
                 <a:cs typeface="Roboto"/>
                 <a:sym typeface="Roboto"/>
               </a:rPr>
-              <a:t>Foreign key </a:t>
+              <a:t>Foreign keys </a:t>
             </a:r>
             <a:endParaRPr b="1" sz="1200">
               <a:solidFill>
@@ -16735,7 +16914,7 @@
       </p:sp>
       <p:pic>
         <p:nvPicPr>
-          <p:cNvPr id="125" name="Google Shape;125;p20"/>
+          <p:cNvPr id="124" name="Google Shape;124;p20"/>
           <p:cNvPicPr preferRelativeResize="0"/>
           <p:nvPr/>
         </p:nvPicPr>
@@ -16749,7 +16928,7 @@
         </p:blipFill>
         <p:spPr>
           <a:xfrm>
-            <a:off x="5360225" y="2695675"/>
+            <a:off x="5445650" y="2249200"/>
             <a:ext cx="3660925" cy="369300"/>
           </a:xfrm>
           <a:prstGeom prst="rect">
@@ -16763,7 +16942,7 @@
       </p:pic>
       <p:sp>
         <p:nvSpPr>
-          <p:cNvPr id="126" name="Google Shape;126;p20"/>
+          <p:cNvPr id="125" name="Google Shape;125;p20"/>
           <p:cNvSpPr txBox="1"/>
           <p:nvPr/>
         </p:nvSpPr>
@@ -16810,6 +16989,34 @@
           </a:p>
         </p:txBody>
       </p:sp>
+      <p:pic>
+        <p:nvPicPr>
+          <p:cNvPr id="126" name="Google Shape;126;p20"/>
+          <p:cNvPicPr preferRelativeResize="0"/>
+          <p:nvPr/>
+        </p:nvPicPr>
+        <p:blipFill>
+          <a:blip r:embed="rId8">
+            <a:alphaModFix/>
+          </a:blip>
+          <a:stretch>
+            <a:fillRect/>
+          </a:stretch>
+        </p:blipFill>
+        <p:spPr>
+          <a:xfrm>
+            <a:off x="5419025" y="3040525"/>
+            <a:ext cx="3714175" cy="380375"/>
+          </a:xfrm>
+          <a:prstGeom prst="rect">
+            <a:avLst/>
+          </a:prstGeom>
+          <a:noFill/>
+          <a:ln>
+            <a:noFill/>
+          </a:ln>
+        </p:spPr>
+      </p:pic>
       <p:sp>
         <p:nvSpPr>
           <p:cNvPr id="127" name="Google Shape;127;p20"/>
@@ -16818,8 +17025,8 @@
         </p:nvSpPr>
         <p:spPr>
           <a:xfrm>
-            <a:off x="6320100" y="4038675"/>
-            <a:ext cx="2847000" cy="461700"/>
+            <a:off x="40850" y="3600175"/>
+            <a:ext cx="5345700" cy="738900"/>
           </a:xfrm>
           <a:prstGeom prst="rect">
             <a:avLst/>
@@ -16845,9 +17052,134 @@
               <a:buNone/>
             </a:pPr>
             <a:r>
-              <a:t/>
-            </a:r>
-            <a:endParaRPr sz="1800">
+              <a:rPr lang="ro" sz="1200">
+                <a:solidFill>
+                  <a:schemeClr val="dk1"/>
+                </a:solidFill>
+                <a:latin typeface="Roboto"/>
+                <a:ea typeface="Roboto"/>
+                <a:cs typeface="Roboto"/>
+                <a:sym typeface="Roboto"/>
+              </a:rPr>
+              <a:t>Coloana </a:t>
+            </a:r>
+            <a:r>
+              <a:rPr lang="ro" sz="1200">
+                <a:solidFill>
+                  <a:srgbClr val="FFFF00"/>
+                </a:solidFill>
+                <a:latin typeface="Roboto"/>
+                <a:ea typeface="Roboto"/>
+                <a:cs typeface="Roboto"/>
+                <a:sym typeface="Roboto"/>
+              </a:rPr>
+              <a:t>id_produs</a:t>
+            </a:r>
+            <a:r>
+              <a:rPr lang="ro" sz="1200">
+                <a:solidFill>
+                  <a:schemeClr val="dk1"/>
+                </a:solidFill>
+                <a:latin typeface="Roboto"/>
+                <a:ea typeface="Roboto"/>
+                <a:cs typeface="Roboto"/>
+                <a:sym typeface="Roboto"/>
+              </a:rPr>
+              <a:t> din tabela </a:t>
+            </a:r>
+            <a:r>
+              <a:rPr lang="ro" sz="1200">
+                <a:solidFill>
+                  <a:srgbClr val="00FF00"/>
+                </a:solidFill>
+                <a:latin typeface="Roboto"/>
+                <a:ea typeface="Roboto"/>
+                <a:cs typeface="Roboto"/>
+                <a:sym typeface="Roboto"/>
+              </a:rPr>
+              <a:t>gestiune_produse</a:t>
+            </a:r>
+            <a:r>
+              <a:rPr lang="ro" sz="1200">
+                <a:solidFill>
+                  <a:schemeClr val="dk1"/>
+                </a:solidFill>
+                <a:latin typeface="Roboto"/>
+                <a:ea typeface="Roboto"/>
+                <a:cs typeface="Roboto"/>
+                <a:sym typeface="Roboto"/>
+              </a:rPr>
+              <a:t> face referinta catre coloana</a:t>
+            </a:r>
+            <a:r>
+              <a:rPr lang="ro" sz="1200">
+                <a:solidFill>
+                  <a:srgbClr val="FFFF00"/>
+                </a:solidFill>
+                <a:latin typeface="Roboto"/>
+                <a:ea typeface="Roboto"/>
+                <a:cs typeface="Roboto"/>
+                <a:sym typeface="Roboto"/>
+              </a:rPr>
+              <a:t> id</a:t>
+            </a:r>
+            <a:r>
+              <a:rPr lang="ro" sz="1200">
+                <a:solidFill>
+                  <a:schemeClr val="dk1"/>
+                </a:solidFill>
+                <a:latin typeface="Roboto"/>
+                <a:ea typeface="Roboto"/>
+                <a:cs typeface="Roboto"/>
+                <a:sym typeface="Roboto"/>
+              </a:rPr>
+              <a:t> din tabela </a:t>
+            </a:r>
+            <a:r>
+              <a:rPr lang="ro" sz="1200">
+                <a:solidFill>
+                  <a:srgbClr val="00FF00"/>
+                </a:solidFill>
+                <a:latin typeface="Roboto"/>
+                <a:ea typeface="Roboto"/>
+                <a:cs typeface="Roboto"/>
+                <a:sym typeface="Roboto"/>
+              </a:rPr>
+              <a:t>produse</a:t>
+            </a:r>
+            <a:endParaRPr sz="1200">
+              <a:solidFill>
+                <a:srgbClr val="00FF00"/>
+              </a:solidFill>
+              <a:latin typeface="Roboto"/>
+              <a:ea typeface="Roboto"/>
+              <a:cs typeface="Roboto"/>
+              <a:sym typeface="Roboto"/>
+            </a:endParaRPr>
+          </a:p>
+          <a:p>
+            <a:pPr indent="0" lvl="0" marL="0" rtl="0" algn="l">
+              <a:spcBef>
+                <a:spcPts val="0"/>
+              </a:spcBef>
+              <a:spcAft>
+                <a:spcPts val="0"/>
+              </a:spcAft>
+              <a:buNone/>
+            </a:pPr>
+            <a:r>
+              <a:rPr lang="ro" sz="1200">
+                <a:solidFill>
+                  <a:schemeClr val="dk1"/>
+                </a:solidFill>
+                <a:latin typeface="Roboto"/>
+                <a:ea typeface="Roboto"/>
+                <a:cs typeface="Roboto"/>
+                <a:sym typeface="Roboto"/>
+              </a:rPr>
+              <a:t>Relatia intre cele doua tabele este 1:1</a:t>
+            </a:r>
+            <a:endParaRPr sz="1200">
               <a:solidFill>
                 <a:schemeClr val="dk1"/>
               </a:solidFill>
@@ -16866,7 +17198,7 @@
           <p:nvPr/>
         </p:nvPicPr>
         <p:blipFill>
-          <a:blip r:embed="rId8">
+          <a:blip r:embed="rId9">
             <a:alphaModFix/>
           </a:blip>
           <a:stretch>
@@ -16875,7 +17207,7 @@
         </p:blipFill>
         <p:spPr>
           <a:xfrm>
-            <a:off x="5333600" y="3502425"/>
+            <a:off x="5392400" y="3717075"/>
             <a:ext cx="3714175" cy="380375"/>
           </a:xfrm>
           <a:prstGeom prst="rect">
@@ -16895,8 +17227,8 @@
         </p:nvSpPr>
         <p:spPr>
           <a:xfrm>
-            <a:off x="159875" y="4130650"/>
-            <a:ext cx="5227500" cy="923400"/>
+            <a:off x="40850" y="4327775"/>
+            <a:ext cx="5345700" cy="738900"/>
           </a:xfrm>
           <a:prstGeom prst="rect">
             <a:avLst/>
@@ -16931,50 +17263,6 @@
                 <a:cs typeface="Roboto"/>
                 <a:sym typeface="Roboto"/>
               </a:rPr>
-              <a:t>                                                </a:t>
-            </a:r>
-            <a:r>
-              <a:rPr b="1" lang="ro" sz="1200">
-                <a:solidFill>
-                  <a:srgbClr val="FF9900"/>
-                </a:solidFill>
-                <a:latin typeface="Roboto"/>
-                <a:ea typeface="Roboto"/>
-                <a:cs typeface="Roboto"/>
-                <a:sym typeface="Roboto"/>
-              </a:rPr>
-              <a:t>Foreign key</a:t>
-            </a:r>
-            <a:endParaRPr b="1" sz="1200">
-              <a:solidFill>
-                <a:srgbClr val="FF9900"/>
-              </a:solidFill>
-              <a:latin typeface="Roboto"/>
-              <a:ea typeface="Roboto"/>
-              <a:cs typeface="Roboto"/>
-              <a:sym typeface="Roboto"/>
-            </a:endParaRPr>
-          </a:p>
-          <a:p>
-            <a:pPr indent="0" lvl="0" marL="0" rtl="0" algn="l">
-              <a:spcBef>
-                <a:spcPts val="0"/>
-              </a:spcBef>
-              <a:spcAft>
-                <a:spcPts val="0"/>
-              </a:spcAft>
-              <a:buNone/>
-            </a:pPr>
-            <a:r>
-              <a:rPr lang="ro" sz="1200">
-                <a:solidFill>
-                  <a:schemeClr val="dk1"/>
-                </a:solidFill>
-                <a:latin typeface="Roboto"/>
-                <a:ea typeface="Roboto"/>
-                <a:cs typeface="Roboto"/>
-                <a:sym typeface="Roboto"/>
-              </a:rPr>
               <a:t>Coloana </a:t>
             </a:r>
             <a:r>
@@ -16987,7 +17275,7 @@
                 <a:cs typeface="Roboto"/>
                 <a:sym typeface="Roboto"/>
               </a:rPr>
-              <a:t>id_produs</a:t>
+              <a:t>id_client</a:t>
             </a:r>
             <a:r>
               <a:rPr lang="ro" sz="1200">
@@ -17011,7 +17299,7 @@
                 <a:cs typeface="Roboto"/>
                 <a:sym typeface="Roboto"/>
               </a:rPr>
-              <a:t>gestiune_produse</a:t>
+              <a:t>comenzi</a:t>
             </a:r>
             <a:r>
               <a:rPr lang="ro" sz="1200">
@@ -17059,7 +17347,7 @@
                 <a:cs typeface="Roboto"/>
                 <a:sym typeface="Roboto"/>
               </a:rPr>
-              <a:t>produse</a:t>
+              <a:t>utilizatori</a:t>
             </a:r>
             <a:endParaRPr sz="1200">
               <a:solidFill>
@@ -17112,7 +17400,7 @@
           <p:nvPr/>
         </p:nvPicPr>
         <p:blipFill>
-          <a:blip r:embed="rId9">
+          <a:blip r:embed="rId10">
             <a:alphaModFix/>
           </a:blip>
           <a:stretch>
@@ -17121,8 +17409,8 @@
         </p:blipFill>
         <p:spPr>
           <a:xfrm>
-            <a:off x="5333600" y="4362675"/>
-            <a:ext cx="3714175" cy="369300"/>
+            <a:off x="5392400" y="4377250"/>
+            <a:ext cx="3714175" cy="380375"/>
           </a:xfrm>
           <a:prstGeom prst="rect">
             <a:avLst/>

</xml_diff>